<commit_message>
Updated Diagrams Updated Document
</commit_message>
<xml_diff>
--- a/DD/diagrams/Architecture.pptx
+++ b/DD/diagrams/Architecture.pptx
@@ -255,7 +255,7 @@
           <a:p>
             <a:fld id="{F42CC2F4-2F6D-40A0-83D9-F1D1A792DD25}" type="datetimeFigureOut">
               <a:rPr lang="it-IT" smtClean="0"/>
-              <a:t>20/11/2015</a:t>
+              <a:t>27/11/2015</a:t>
             </a:fld>
             <a:endParaRPr lang="it-IT"/>
           </a:p>
@@ -425,7 +425,7 @@
           <a:p>
             <a:fld id="{F42CC2F4-2F6D-40A0-83D9-F1D1A792DD25}" type="datetimeFigureOut">
               <a:rPr lang="it-IT" smtClean="0"/>
-              <a:t>20/11/2015</a:t>
+              <a:t>27/11/2015</a:t>
             </a:fld>
             <a:endParaRPr lang="it-IT"/>
           </a:p>
@@ -605,7 +605,7 @@
           <a:p>
             <a:fld id="{F42CC2F4-2F6D-40A0-83D9-F1D1A792DD25}" type="datetimeFigureOut">
               <a:rPr lang="it-IT" smtClean="0"/>
-              <a:t>20/11/2015</a:t>
+              <a:t>27/11/2015</a:t>
             </a:fld>
             <a:endParaRPr lang="it-IT"/>
           </a:p>
@@ -775,7 +775,7 @@
           <a:p>
             <a:fld id="{F42CC2F4-2F6D-40A0-83D9-F1D1A792DD25}" type="datetimeFigureOut">
               <a:rPr lang="it-IT" smtClean="0"/>
-              <a:t>20/11/2015</a:t>
+              <a:t>27/11/2015</a:t>
             </a:fld>
             <a:endParaRPr lang="it-IT"/>
           </a:p>
@@ -1021,7 +1021,7 @@
           <a:p>
             <a:fld id="{F42CC2F4-2F6D-40A0-83D9-F1D1A792DD25}" type="datetimeFigureOut">
               <a:rPr lang="it-IT" smtClean="0"/>
-              <a:t>20/11/2015</a:t>
+              <a:t>27/11/2015</a:t>
             </a:fld>
             <a:endParaRPr lang="it-IT"/>
           </a:p>
@@ -1253,7 +1253,7 @@
           <a:p>
             <a:fld id="{F42CC2F4-2F6D-40A0-83D9-F1D1A792DD25}" type="datetimeFigureOut">
               <a:rPr lang="it-IT" smtClean="0"/>
-              <a:t>20/11/2015</a:t>
+              <a:t>27/11/2015</a:t>
             </a:fld>
             <a:endParaRPr lang="it-IT"/>
           </a:p>
@@ -1620,7 +1620,7 @@
           <a:p>
             <a:fld id="{F42CC2F4-2F6D-40A0-83D9-F1D1A792DD25}" type="datetimeFigureOut">
               <a:rPr lang="it-IT" smtClean="0"/>
-              <a:t>20/11/2015</a:t>
+              <a:t>27/11/2015</a:t>
             </a:fld>
             <a:endParaRPr lang="it-IT"/>
           </a:p>
@@ -1738,7 +1738,7 @@
           <a:p>
             <a:fld id="{F42CC2F4-2F6D-40A0-83D9-F1D1A792DD25}" type="datetimeFigureOut">
               <a:rPr lang="it-IT" smtClean="0"/>
-              <a:t>20/11/2015</a:t>
+              <a:t>27/11/2015</a:t>
             </a:fld>
             <a:endParaRPr lang="it-IT"/>
           </a:p>
@@ -1833,7 +1833,7 @@
           <a:p>
             <a:fld id="{F42CC2F4-2F6D-40A0-83D9-F1D1A792DD25}" type="datetimeFigureOut">
               <a:rPr lang="it-IT" smtClean="0"/>
-              <a:t>20/11/2015</a:t>
+              <a:t>27/11/2015</a:t>
             </a:fld>
             <a:endParaRPr lang="it-IT"/>
           </a:p>
@@ -2110,7 +2110,7 @@
           <a:p>
             <a:fld id="{F42CC2F4-2F6D-40A0-83D9-F1D1A792DD25}" type="datetimeFigureOut">
               <a:rPr lang="it-IT" smtClean="0"/>
-              <a:t>20/11/2015</a:t>
+              <a:t>27/11/2015</a:t>
             </a:fld>
             <a:endParaRPr lang="it-IT"/>
           </a:p>
@@ -2363,7 +2363,7 @@
           <a:p>
             <a:fld id="{F42CC2F4-2F6D-40A0-83D9-F1D1A792DD25}" type="datetimeFigureOut">
               <a:rPr lang="it-IT" smtClean="0"/>
-              <a:t>20/11/2015</a:t>
+              <a:t>27/11/2015</a:t>
             </a:fld>
             <a:endParaRPr lang="it-IT"/>
           </a:p>
@@ -2576,7 +2576,7 @@
           <a:p>
             <a:fld id="{F42CC2F4-2F6D-40A0-83D9-F1D1A792DD25}" type="datetimeFigureOut">
               <a:rPr lang="it-IT" smtClean="0"/>
-              <a:t>20/11/2015</a:t>
+              <a:t>27/11/2015</a:t>
             </a:fld>
             <a:endParaRPr lang="it-IT"/>
           </a:p>
@@ -2990,9 +2990,9 @@
         <p:grpSpPr>
           <a:xfrm>
             <a:off x="975714" y="336380"/>
-            <a:ext cx="10559309" cy="6412122"/>
+            <a:ext cx="10433350" cy="6412122"/>
             <a:chOff x="975714" y="336380"/>
-            <a:chExt cx="10559309" cy="6412122"/>
+            <a:chExt cx="10433350" cy="6412122"/>
           </a:xfrm>
         </p:grpSpPr>
         <p:grpSp>
@@ -3241,47 +3241,6 @@
             </a:fontRef>
           </p:style>
         </p:cxnSp>
-        <p:pic>
-          <p:nvPicPr>
-            <p:cNvPr id="1030" name="Picture 6" descr="http://www.clipartbest.com/cliparts/4ib/o5e/4ibo5e55T."/>
-            <p:cNvPicPr>
-              <a:picLocks noChangeAspect="1" noChangeArrowheads="1"/>
-            </p:cNvPicPr>
-            <p:nvPr/>
-          </p:nvPicPr>
-          <p:blipFill>
-            <a:blip r:embed="rId4" cstate="print">
-              <a:extLst>
-                <a:ext uri="{28A0092B-C50C-407E-A947-70E740481C1C}">
-                  <a14:useLocalDpi xmlns:a14="http://schemas.microsoft.com/office/drawing/2010/main" val="0"/>
-                </a:ext>
-              </a:extLst>
-            </a:blip>
-            <a:srcRect/>
-            <a:stretch>
-              <a:fillRect/>
-            </a:stretch>
-          </p:blipFill>
-          <p:spPr bwMode="auto">
-            <a:xfrm>
-              <a:off x="9236946" y="3048228"/>
-              <a:ext cx="845535" cy="967021"/>
-            </a:xfrm>
-            <a:prstGeom prst="rect">
-              <a:avLst/>
-            </a:prstGeom>
-            <a:noFill/>
-            <a:extLst>
-              <a:ext uri="{909E8E84-426E-40DD-AFC4-6F175D3DCCD1}">
-                <a14:hiddenFill xmlns:a14="http://schemas.microsoft.com/office/drawing/2010/main">
-                  <a:solidFill>
-                    <a:srgbClr val="FFFFFF"/>
-                  </a:solidFill>
-                </a14:hiddenFill>
-              </a:ext>
-            </a:extLst>
-          </p:spPr>
-        </p:pic>
         <p:cxnSp>
           <p:nvCxnSpPr>
             <p:cNvPr id="19" name="Connettore 2 18"/>
@@ -3472,7 +3431,7 @@
                 <p:nvPr/>
               </p:nvPicPr>
               <p:blipFill>
-                <a:blip r:embed="rId5" cstate="print">
+                <a:blip r:embed="rId4" cstate="print">
                   <a:extLst>
                     <a:ext uri="{28A0092B-C50C-407E-A947-70E740481C1C}">
                       <a14:useLocalDpi xmlns:a14="http://schemas.microsoft.com/office/drawing/2010/main" val="0"/>
@@ -3626,7 +3585,7 @@
               <p:nvPr/>
             </p:nvPicPr>
             <p:blipFill>
-              <a:blip r:embed="rId6" cstate="print">
+              <a:blip r:embed="rId5" cstate="print">
                 <a:extLst>
                   <a:ext uri="{28A0092B-C50C-407E-A947-70E740481C1C}">
                     <a14:useLocalDpi xmlns:a14="http://schemas.microsoft.com/office/drawing/2010/main" val="0"/>
@@ -3682,7 +3641,7 @@
               <p:nvPr/>
             </p:nvPicPr>
             <p:blipFill rotWithShape="1">
-              <a:blip r:embed="rId7" cstate="print">
+              <a:blip r:embed="rId6" cstate="print">
                 <a:extLst>
                   <a:ext uri="{28A0092B-C50C-407E-A947-70E740481C1C}">
                     <a14:useLocalDpi xmlns:a14="http://schemas.microsoft.com/office/drawing/2010/main" val="0"/>
@@ -3770,7 +3729,7 @@
               <p:nvPr/>
             </p:nvPicPr>
             <p:blipFill rotWithShape="1">
-              <a:blip r:embed="rId8">
+              <a:blip r:embed="rId7">
                 <a:extLst>
                   <a:ext uri="{28A0092B-C50C-407E-A947-70E740481C1C}">
                     <a14:useLocalDpi xmlns:a14="http://schemas.microsoft.com/office/drawing/2010/main" val="0"/>
@@ -3951,7 +3910,7 @@
             <p:nvPr/>
           </p:nvPicPr>
           <p:blipFill>
-            <a:blip r:embed="rId4" cstate="print">
+            <a:blip r:embed="rId8" cstate="print">
               <a:extLst>
                 <a:ext uri="{28A0092B-C50C-407E-A947-70E740481C1C}">
                   <a14:useLocalDpi xmlns:a14="http://schemas.microsoft.com/office/drawing/2010/main" val="0"/>
@@ -4159,10 +4118,10 @@
           </p:nvGrpSpPr>
           <p:grpSpPr>
             <a:xfrm>
-              <a:off x="10082480" y="336380"/>
-              <a:ext cx="1452543" cy="767165"/>
-              <a:chOff x="2053652" y="204375"/>
-              <a:chExt cx="3594348" cy="767165"/>
+              <a:off x="10082479" y="336380"/>
+              <a:ext cx="1326582" cy="762108"/>
+              <a:chOff x="2053651" y="204375"/>
+              <a:chExt cx="3282655" cy="762108"/>
             </a:xfrm>
           </p:grpSpPr>
           <p:sp>
@@ -4173,8 +4132,8 @@
             </p:nvSpPr>
             <p:spPr>
               <a:xfrm rot="5400000">
-                <a:off x="3727195" y="-949265"/>
-                <a:ext cx="247262" cy="3594348"/>
+                <a:off x="3573877" y="-795946"/>
+                <a:ext cx="242203" cy="3282655"/>
               </a:xfrm>
               <a:prstGeom prst="leftBrace">
                 <a:avLst/>
@@ -4212,8 +4171,8 @@
             </p:nvSpPr>
             <p:spPr>
               <a:xfrm>
-                <a:off x="3347673" y="204375"/>
-                <a:ext cx="1038763" cy="369332"/>
+                <a:off x="3186054" y="204375"/>
+                <a:ext cx="1038762" cy="369332"/>
               </a:xfrm>
               <a:prstGeom prst="rect">
                 <a:avLst/>
@@ -4235,6 +4194,47 @@
             </p:txBody>
           </p:sp>
         </p:grpSp>
+        <p:pic>
+          <p:nvPicPr>
+            <p:cNvPr id="1030" name="Picture 6" descr="http://www.clipartbest.com/cliparts/4ib/o5e/4ibo5e55T."/>
+            <p:cNvPicPr>
+              <a:picLocks noChangeAspect="1" noChangeArrowheads="1"/>
+            </p:cNvPicPr>
+            <p:nvPr/>
+          </p:nvPicPr>
+          <p:blipFill>
+            <a:blip r:embed="rId8" cstate="print">
+              <a:extLst>
+                <a:ext uri="{28A0092B-C50C-407E-A947-70E740481C1C}">
+                  <a14:useLocalDpi xmlns:a14="http://schemas.microsoft.com/office/drawing/2010/main" val="0"/>
+                </a:ext>
+              </a:extLst>
+            </a:blip>
+            <a:srcRect/>
+            <a:stretch>
+              <a:fillRect/>
+            </a:stretch>
+          </p:blipFill>
+          <p:spPr bwMode="auto">
+            <a:xfrm>
+              <a:off x="9236946" y="3048228"/>
+              <a:ext cx="845535" cy="967021"/>
+            </a:xfrm>
+            <a:prstGeom prst="rect">
+              <a:avLst/>
+            </a:prstGeom>
+            <a:noFill/>
+            <a:extLst>
+              <a:ext uri="{909E8E84-426E-40DD-AFC4-6F175D3DCCD1}">
+                <a14:hiddenFill xmlns:a14="http://schemas.microsoft.com/office/drawing/2010/main">
+                  <a:solidFill>
+                    <a:srgbClr val="FFFFFF"/>
+                  </a:solidFill>
+                </a14:hiddenFill>
+              </a:ext>
+            </a:extLst>
+          </p:spPr>
+        </p:pic>
       </p:grpSp>
     </p:spTree>
     <p:extLst>
@@ -4630,7 +4630,6 @@
                 <a:rPr lang="en-GB" sz="3200" dirty="0" smtClean="0"/>
                 <a:t>Request</a:t>
               </a:r>
-              <a:endParaRPr lang="en-GB" sz="3200" dirty="0" smtClean="0"/>
             </a:p>
           </p:txBody>
         </p:sp>
@@ -4699,7 +4698,6 @@
                 <a:rPr lang="en-GB" sz="3200" dirty="0" smtClean="0"/>
                 <a:t>Response</a:t>
               </a:r>
-              <a:endParaRPr lang="en-GB" sz="3200" dirty="0" smtClean="0"/>
             </a:p>
           </p:txBody>
         </p:sp>
@@ -4812,7 +4810,6 @@
                 <a:rPr lang="en-GB" sz="3200" dirty="0" smtClean="0"/>
                 <a:t>Subscribe</a:t>
               </a:r>
-              <a:endParaRPr lang="en-GB" sz="3200" dirty="0" smtClean="0"/>
             </a:p>
           </p:txBody>
         </p:sp>
@@ -4843,7 +4840,6 @@
                 <a:rPr lang="en-GB" sz="3200" dirty="0" smtClean="0"/>
                 <a:t>Publish</a:t>
               </a:r>
-              <a:endParaRPr lang="en-GB" sz="3200" dirty="0" smtClean="0"/>
             </a:p>
           </p:txBody>
         </p:sp>

</xml_diff>